<commit_message>
Exploring different detector angles
</commit_message>
<xml_diff>
--- a/crystals/2023-07-03/case4.0 (calibration, nesh's version)/Segments4_retrieved analysis.pptx
+++ b/crystals/2023-07-03/case4.0 (calibration, nesh's version)/Segments4_retrieved analysis.pptx
@@ -6,6 +6,8 @@
   </p:sldMasterIdLst>
   <p:sldIdLst>
     <p:sldId id="256" r:id="rId2"/>
+    <p:sldId id="260" r:id="rId3"/>
+    <p:sldId id="258" r:id="rId4"/>
   </p:sldIdLst>
   <p:sldSz cx="12192000" cy="6858000"/>
   <p:notesSz cx="6858000" cy="9144000"/>
@@ -106,13 +108,7 @@
   </p:defaultTextStyle>
   <p:extLst>
     <p:ext uri="{EFAFB233-063F-42B5-8137-9DF3F51BA10A}">
-      <p15:sldGuideLst xmlns:p15="http://schemas.microsoft.com/office/powerpoint/2012/main">
-        <p15:guide id="1" orient="horz" userDrawn="1">
-          <p15:clr>
-            <a:srgbClr val="A4A3A4"/>
-          </p15:clr>
-        </p15:guide>
-      </p15:sldGuideLst>
+      <p15:sldGuideLst xmlns:p15="http://schemas.microsoft.com/office/powerpoint/2012/main"/>
     </p:ext>
   </p:extLst>
 </p:presentation>
@@ -3428,7 +3424,7 @@
         </p:nvSpPr>
         <p:spPr>
           <a:xfrm>
-            <a:off x="5548311" y="2287200"/>
+            <a:off x="5554135" y="1930079"/>
             <a:ext cx="319089" cy="369332"/>
           </a:xfrm>
           <a:prstGeom prst="rect">
@@ -3437,6 +3433,11 @@
           <a:solidFill>
             <a:schemeClr val="bg1"/>
           </a:solidFill>
+          <a:ln>
+            <a:solidFill>
+              <a:schemeClr val="accent1"/>
+            </a:solidFill>
+          </a:ln>
         </p:spPr>
         <p:txBody>
           <a:bodyPr wrap="square">
@@ -3474,6 +3475,11 @@
           <a:solidFill>
             <a:schemeClr val="bg1"/>
           </a:solidFill>
+          <a:ln>
+            <a:solidFill>
+              <a:schemeClr val="accent1"/>
+            </a:solidFill>
+          </a:ln>
         </p:spPr>
         <p:txBody>
           <a:bodyPr wrap="square">
@@ -3511,6 +3517,11 @@
           <a:solidFill>
             <a:schemeClr val="bg1"/>
           </a:solidFill>
+          <a:ln>
+            <a:solidFill>
+              <a:schemeClr val="accent1"/>
+            </a:solidFill>
+          </a:ln>
         </p:spPr>
         <p:txBody>
           <a:bodyPr wrap="square">
@@ -3548,6 +3559,11 @@
           <a:solidFill>
             <a:schemeClr val="bg1"/>
           </a:solidFill>
+          <a:ln>
+            <a:solidFill>
+              <a:schemeClr val="accent1"/>
+            </a:solidFill>
+          </a:ln>
         </p:spPr>
         <p:txBody>
           <a:bodyPr wrap="square">
@@ -3566,6 +3582,1148 @@
     <p:extLst>
       <p:ext uri="{BB962C8B-B14F-4D97-AF65-F5344CB8AC3E}">
         <p14:creationId xmlns:p14="http://schemas.microsoft.com/office/powerpoint/2010/main" val="1115087131"/>
+      </p:ext>
+    </p:extLst>
+  </p:cSld>
+  <p:clrMapOvr>
+    <a:masterClrMapping/>
+  </p:clrMapOvr>
+</p:sld>
+</file>
+
+<file path=ppt/slides/slide2.xml><?xml version="1.0" encoding="utf-8"?>
+<p:sld xmlns:a="http://schemas.openxmlformats.org/drawingml/2006/main" xmlns:r="http://schemas.openxmlformats.org/officeDocument/2006/relationships" xmlns:p="http://schemas.openxmlformats.org/presentationml/2006/main">
+  <p:cSld>
+    <p:spTree>
+      <p:nvGrpSpPr>
+        <p:cNvPr id="1" name=""/>
+        <p:cNvGrpSpPr/>
+        <p:nvPr/>
+      </p:nvGrpSpPr>
+      <p:grpSpPr>
+        <a:xfrm>
+          <a:off x="0" y="0"/>
+          <a:ext cx="0" cy="0"/>
+          <a:chOff x="0" y="0"/>
+          <a:chExt cx="0" cy="0"/>
+        </a:xfrm>
+      </p:grpSpPr>
+      <p:sp>
+        <p:nvSpPr>
+          <p:cNvPr id="9" name="TextBox 8">
+            <a:extLst>
+              <a:ext uri="{FF2B5EF4-FFF2-40B4-BE49-F238E27FC236}">
+                <a16:creationId xmlns:a16="http://schemas.microsoft.com/office/drawing/2014/main" id="{46AD3E84-0CD6-2973-5A4F-1A6C6AE17047}"/>
+              </a:ext>
+            </a:extLst>
+          </p:cNvPr>
+          <p:cNvSpPr txBox="1"/>
+          <p:nvPr/>
+        </p:nvSpPr>
+        <p:spPr>
+          <a:xfrm>
+            <a:off x="4035580" y="3429000"/>
+            <a:ext cx="8047454" cy="3139321"/>
+          </a:xfrm>
+          <a:prstGeom prst="rect">
+            <a:avLst/>
+          </a:prstGeom>
+          <a:noFill/>
+        </p:spPr>
+        <p:txBody>
+          <a:bodyPr wrap="square" rtlCol="0">
+            <a:spAutoFit/>
+          </a:bodyPr>
+          <a:lstStyle/>
+          <a:p>
+            <a:r>
+              <a:rPr lang="en-US" dirty="0"/>
+              <a:t>Results:</a:t>
+            </a:r>
+          </a:p>
+          <a:p>
+            <a:pPr marL="342900" indent="-342900">
+              <a:buFont typeface="+mj-lt"/>
+              <a:buAutoNum type="arabicPeriod"/>
+            </a:pPr>
+            <a:r>
+              <a:rPr lang="en-US" dirty="0"/>
+              <a:t>Use of </a:t>
+            </a:r>
+            <a:r>
+              <a:rPr lang="en-US" b="1" dirty="0"/>
+              <a:t>ABT=17</a:t>
+            </a:r>
+            <a:r>
+              <a:rPr lang="en-US" b="1" baseline="30000" dirty="0"/>
+              <a:t>o</a:t>
+            </a:r>
+            <a:r>
+              <a:rPr lang="en-US" b="1" dirty="0"/>
+              <a:t> </a:t>
+            </a:r>
+            <a:r>
+              <a:rPr lang="en-US" dirty="0"/>
+              <a:t>(“Angle Between Detectors”), as specified in GNBF_2_calibrate_from_Xtlvecs, produced a more accurate retrieved basal-to-pyramidal angle (57.4</a:t>
+            </a:r>
+            <a:r>
+              <a:rPr lang="en-US" baseline="30000" dirty="0"/>
+              <a:t>o</a:t>
+            </a:r>
+            <a:r>
+              <a:rPr lang="en-US" dirty="0"/>
+              <a:t>) than produced by </a:t>
+            </a:r>
+            <a:r>
+              <a:rPr lang="en-US" b="1" dirty="0"/>
+              <a:t>ABT=15</a:t>
+            </a:r>
+            <a:r>
+              <a:rPr lang="en-US" b="1" baseline="30000" dirty="0"/>
+              <a:t>o </a:t>
+            </a:r>
+            <a:r>
+              <a:rPr lang="en-US" dirty="0"/>
+              <a:t>(54.6</a:t>
+            </a:r>
+            <a:r>
+              <a:rPr lang="en-US" baseline="30000" dirty="0"/>
+              <a:t>o</a:t>
+            </a:r>
+            <a:r>
+              <a:rPr lang="en-US" dirty="0"/>
+              <a:t>). There’s an upper limit, however: when I tried </a:t>
+            </a:r>
+            <a:r>
+              <a:rPr lang="en-US" b="1" dirty="0"/>
+              <a:t>ABT=20</a:t>
+            </a:r>
+            <a:r>
+              <a:rPr lang="en-US" b="1" baseline="30000" dirty="0"/>
+              <a:t>o</a:t>
+            </a:r>
+            <a:r>
+              <a:rPr lang="en-US" dirty="0"/>
+              <a:t>, the retrieval algorithm failed in segment 5. </a:t>
+            </a:r>
+          </a:p>
+          <a:p>
+            <a:pPr marL="342900" indent="-342900">
+              <a:buFont typeface="+mj-lt"/>
+              <a:buAutoNum type="arabicPeriod"/>
+            </a:pPr>
+            <a:r>
+              <a:rPr lang="en-US" dirty="0"/>
+              <a:t>On the other hand, </a:t>
+            </a:r>
+            <a:r>
+              <a:rPr lang="en-US" b="1" dirty="0"/>
+              <a:t>smaller ABT values </a:t>
+            </a:r>
+            <a:r>
+              <a:rPr lang="en-US" dirty="0"/>
+              <a:t>produce </a:t>
+            </a:r>
+            <a:r>
+              <a:rPr lang="en-US" b="1" dirty="0"/>
+              <a:t>smaller retrieved angles</a:t>
+            </a:r>
+            <a:r>
+              <a:rPr lang="en-US" dirty="0"/>
+              <a:t>, so  I don’t want to go that direction.</a:t>
+            </a:r>
+          </a:p>
+          <a:p>
+            <a:pPr marL="342900" indent="-342900">
+              <a:buFont typeface="+mj-lt"/>
+              <a:buAutoNum type="arabicPeriod"/>
+            </a:pPr>
+            <a:r>
+              <a:rPr lang="en-US" dirty="0"/>
+              <a:t>The apparent </a:t>
+            </a:r>
+            <a:r>
+              <a:rPr lang="en-US" dirty="0" err="1"/>
+              <a:t>cocave</a:t>
+            </a:r>
+            <a:r>
+              <a:rPr lang="en-US" dirty="0"/>
+              <a:t> curvature of the center of the basal facet (see next slide) increases with ADA. Therefore, using the more accurate </a:t>
+            </a:r>
+            <a:r>
+              <a:rPr lang="en-US" b="1" dirty="0"/>
+              <a:t>ADA=17</a:t>
+            </a:r>
+            <a:r>
+              <a:rPr lang="en-US" b="1" baseline="30000" dirty="0"/>
+              <a:t>o</a:t>
+            </a:r>
+            <a:r>
+              <a:rPr lang="en-US" dirty="0"/>
+              <a:t> will produce a slightly more concave surface. We conclude that the concavity is “real” (i.e., not an artifact of a </a:t>
+            </a:r>
+            <a:r>
+              <a:rPr lang="en-US"/>
+              <a:t>bad value of ADA).</a:t>
+            </a:r>
+            <a:endParaRPr lang="en-US" dirty="0"/>
+          </a:p>
+        </p:txBody>
+      </p:sp>
+      <p:grpSp>
+        <p:nvGrpSpPr>
+          <p:cNvPr id="16" name="Group 15">
+            <a:extLst>
+              <a:ext uri="{FF2B5EF4-FFF2-40B4-BE49-F238E27FC236}">
+                <a16:creationId xmlns:a16="http://schemas.microsoft.com/office/drawing/2014/main" id="{B6291C2D-3799-768F-6D0D-5F0F4609D2EE}"/>
+              </a:ext>
+            </a:extLst>
+          </p:cNvPr>
+          <p:cNvGrpSpPr/>
+          <p:nvPr/>
+        </p:nvGrpSpPr>
+        <p:grpSpPr>
+          <a:xfrm>
+            <a:off x="144046" y="524811"/>
+            <a:ext cx="4000500" cy="2245968"/>
+            <a:chOff x="277368" y="3183282"/>
+            <a:chExt cx="4000500" cy="2245968"/>
+          </a:xfrm>
+        </p:grpSpPr>
+        <p:grpSp>
+          <p:nvGrpSpPr>
+            <p:cNvPr id="12" name="Group 11">
+              <a:extLst>
+                <a:ext uri="{FF2B5EF4-FFF2-40B4-BE49-F238E27FC236}">
+                  <a16:creationId xmlns:a16="http://schemas.microsoft.com/office/drawing/2014/main" id="{457734B0-2989-A3A1-A2ED-01D9CB0111D6}"/>
+                </a:ext>
+              </a:extLst>
+            </p:cNvPr>
+            <p:cNvGrpSpPr/>
+            <p:nvPr/>
+          </p:nvGrpSpPr>
+          <p:grpSpPr>
+            <a:xfrm>
+              <a:off x="277368" y="3582416"/>
+              <a:ext cx="4000500" cy="1846834"/>
+              <a:chOff x="7344918" y="841649"/>
+              <a:chExt cx="4000500" cy="1846834"/>
+            </a:xfrm>
+          </p:grpSpPr>
+          <p:pic>
+            <p:nvPicPr>
+              <p:cNvPr id="3" name="Picture 2">
+                <a:extLst>
+                  <a:ext uri="{FF2B5EF4-FFF2-40B4-BE49-F238E27FC236}">
+                    <a16:creationId xmlns:a16="http://schemas.microsoft.com/office/drawing/2014/main" id="{11595FE8-7706-72BF-3AD4-E66946335DCA}"/>
+                  </a:ext>
+                </a:extLst>
+              </p:cNvPr>
+              <p:cNvPicPr>
+                <a:picLocks noChangeAspect="1"/>
+              </p:cNvPicPr>
+              <p:nvPr/>
+            </p:nvPicPr>
+            <p:blipFill rotWithShape="1">
+              <a:blip r:embed="rId2"/>
+              <a:srcRect b="42748"/>
+              <a:stretch/>
+            </p:blipFill>
+            <p:spPr>
+              <a:xfrm>
+                <a:off x="7344918" y="841649"/>
+                <a:ext cx="4000500" cy="1846834"/>
+              </a:xfrm>
+              <a:prstGeom prst="rect">
+                <a:avLst/>
+              </a:prstGeom>
+            </p:spPr>
+          </p:pic>
+          <p:sp>
+            <p:nvSpPr>
+              <p:cNvPr id="8" name="Rectangle 7">
+                <a:extLst>
+                  <a:ext uri="{FF2B5EF4-FFF2-40B4-BE49-F238E27FC236}">
+                    <a16:creationId xmlns:a16="http://schemas.microsoft.com/office/drawing/2014/main" id="{AEE9E952-3549-13E2-FE8B-EB783D25F53F}"/>
+                  </a:ext>
+                </a:extLst>
+              </p:cNvPr>
+              <p:cNvSpPr/>
+              <p:nvPr/>
+            </p:nvSpPr>
+            <p:spPr>
+              <a:xfrm>
+                <a:off x="7426452" y="2181499"/>
+                <a:ext cx="3659632" cy="190500"/>
+              </a:xfrm>
+              <a:prstGeom prst="rect">
+                <a:avLst/>
+              </a:prstGeom>
+              <a:solidFill>
+                <a:schemeClr val="accent1">
+                  <a:alpha val="27000"/>
+                </a:schemeClr>
+              </a:solidFill>
+            </p:spPr>
+            <p:style>
+              <a:lnRef idx="2">
+                <a:schemeClr val="accent1">
+                  <a:shade val="15000"/>
+                </a:schemeClr>
+              </a:lnRef>
+              <a:fillRef idx="1">
+                <a:schemeClr val="accent1"/>
+              </a:fillRef>
+              <a:effectRef idx="0">
+                <a:schemeClr val="accent1"/>
+              </a:effectRef>
+              <a:fontRef idx="minor">
+                <a:schemeClr val="lt1"/>
+              </a:fontRef>
+            </p:style>
+            <p:txBody>
+              <a:bodyPr rtlCol="0" anchor="ctr"/>
+              <a:lstStyle/>
+              <a:p>
+                <a:pPr algn="ctr"/>
+                <a:endParaRPr lang="en-US"/>
+              </a:p>
+            </p:txBody>
+          </p:sp>
+        </p:grpSp>
+        <p:sp>
+          <p:nvSpPr>
+            <p:cNvPr id="13" name="TextBox 12">
+              <a:extLst>
+                <a:ext uri="{FF2B5EF4-FFF2-40B4-BE49-F238E27FC236}">
+                  <a16:creationId xmlns:a16="http://schemas.microsoft.com/office/drawing/2014/main" id="{B9FC66B0-289A-CD7A-2888-8918105049AD}"/>
+                </a:ext>
+              </a:extLst>
+            </p:cNvPr>
+            <p:cNvSpPr txBox="1"/>
+            <p:nvPr/>
+          </p:nvSpPr>
+          <p:spPr>
+            <a:xfrm>
+              <a:off x="358902" y="3183282"/>
+              <a:ext cx="3017520" cy="461665"/>
+            </a:xfrm>
+            <a:prstGeom prst="rect">
+              <a:avLst/>
+            </a:prstGeom>
+            <a:solidFill>
+              <a:schemeClr val="bg1"/>
+            </a:solidFill>
+            <a:ln>
+              <a:solidFill>
+                <a:schemeClr val="accent1"/>
+              </a:solidFill>
+            </a:ln>
+          </p:spPr>
+          <p:txBody>
+            <a:bodyPr wrap="square" rtlCol="0">
+              <a:spAutoFit/>
+            </a:bodyPr>
+            <a:lstStyle/>
+            <a:p>
+              <a:r>
+                <a:rPr lang="en-US" sz="2400" dirty="0"/>
+                <a:t>Using ADA=17</a:t>
+              </a:r>
+              <a:r>
+                <a:rPr lang="en-US" sz="2400" baseline="30000" dirty="0"/>
+                <a:t>o</a:t>
+              </a:r>
+              <a:endParaRPr lang="en-US" sz="2400" dirty="0"/>
+            </a:p>
+          </p:txBody>
+        </p:sp>
+      </p:grpSp>
+      <p:grpSp>
+        <p:nvGrpSpPr>
+          <p:cNvPr id="15" name="Group 14">
+            <a:extLst>
+              <a:ext uri="{FF2B5EF4-FFF2-40B4-BE49-F238E27FC236}">
+                <a16:creationId xmlns:a16="http://schemas.microsoft.com/office/drawing/2014/main" id="{66B92FB3-69F9-9C4F-A648-16888B9A4915}"/>
+              </a:ext>
+            </a:extLst>
+          </p:cNvPr>
+          <p:cNvGrpSpPr/>
+          <p:nvPr/>
+        </p:nvGrpSpPr>
+        <p:grpSpPr>
+          <a:xfrm>
+            <a:off x="225580" y="3521295"/>
+            <a:ext cx="3810000" cy="2257485"/>
+            <a:chOff x="277368" y="-80356"/>
+            <a:chExt cx="3810000" cy="2257485"/>
+          </a:xfrm>
+        </p:grpSpPr>
+        <p:grpSp>
+          <p:nvGrpSpPr>
+            <p:cNvPr id="11" name="Group 10">
+              <a:extLst>
+                <a:ext uri="{FF2B5EF4-FFF2-40B4-BE49-F238E27FC236}">
+                  <a16:creationId xmlns:a16="http://schemas.microsoft.com/office/drawing/2014/main" id="{EBFDE65A-B514-A188-2CD4-B6C8F30BA25B}"/>
+                </a:ext>
+              </a:extLst>
+            </p:cNvPr>
+            <p:cNvGrpSpPr/>
+            <p:nvPr/>
+          </p:nvGrpSpPr>
+          <p:grpSpPr>
+            <a:xfrm>
+              <a:off x="277368" y="437481"/>
+              <a:ext cx="3810000" cy="1739648"/>
+              <a:chOff x="1229868" y="917849"/>
+              <a:chExt cx="3810000" cy="1739648"/>
+            </a:xfrm>
+          </p:grpSpPr>
+          <p:pic>
+            <p:nvPicPr>
+              <p:cNvPr id="5" name="Picture 4">
+                <a:extLst>
+                  <a:ext uri="{FF2B5EF4-FFF2-40B4-BE49-F238E27FC236}">
+                    <a16:creationId xmlns:a16="http://schemas.microsoft.com/office/drawing/2014/main" id="{86B5F3A2-8C90-B2BA-5B90-7FE99E343F1A}"/>
+                  </a:ext>
+                </a:extLst>
+              </p:cNvPr>
+              <p:cNvPicPr>
+                <a:picLocks noChangeAspect="1"/>
+              </p:cNvPicPr>
+              <p:nvPr/>
+            </p:nvPicPr>
+            <p:blipFill rotWithShape="1">
+              <a:blip r:embed="rId3"/>
+              <a:srcRect b="44766"/>
+              <a:stretch/>
+            </p:blipFill>
+            <p:spPr>
+              <a:xfrm>
+                <a:off x="1229868" y="917849"/>
+                <a:ext cx="3810000" cy="1739648"/>
+              </a:xfrm>
+              <a:prstGeom prst="rect">
+                <a:avLst/>
+              </a:prstGeom>
+            </p:spPr>
+          </p:pic>
+          <p:sp>
+            <p:nvSpPr>
+              <p:cNvPr id="7" name="Rectangle 6">
+                <a:extLst>
+                  <a:ext uri="{FF2B5EF4-FFF2-40B4-BE49-F238E27FC236}">
+                    <a16:creationId xmlns:a16="http://schemas.microsoft.com/office/drawing/2014/main" id="{8AA6B014-9D70-14BE-7F99-F0DF6758EBE8}"/>
+                  </a:ext>
+                </a:extLst>
+              </p:cNvPr>
+              <p:cNvSpPr/>
+              <p:nvPr/>
+            </p:nvSpPr>
+            <p:spPr>
+              <a:xfrm>
+                <a:off x="1229868" y="2133600"/>
+                <a:ext cx="3659632" cy="190500"/>
+              </a:xfrm>
+              <a:prstGeom prst="rect">
+                <a:avLst/>
+              </a:prstGeom>
+              <a:solidFill>
+                <a:schemeClr val="accent1">
+                  <a:alpha val="27000"/>
+                </a:schemeClr>
+              </a:solidFill>
+            </p:spPr>
+            <p:style>
+              <a:lnRef idx="2">
+                <a:schemeClr val="accent1">
+                  <a:shade val="15000"/>
+                </a:schemeClr>
+              </a:lnRef>
+              <a:fillRef idx="1">
+                <a:schemeClr val="accent1"/>
+              </a:fillRef>
+              <a:effectRef idx="0">
+                <a:schemeClr val="accent1"/>
+              </a:effectRef>
+              <a:fontRef idx="minor">
+                <a:schemeClr val="lt1"/>
+              </a:fontRef>
+            </p:style>
+            <p:txBody>
+              <a:bodyPr rtlCol="0" anchor="ctr"/>
+              <a:lstStyle/>
+              <a:p>
+                <a:pPr algn="ctr"/>
+                <a:endParaRPr lang="en-US"/>
+              </a:p>
+            </p:txBody>
+          </p:sp>
+        </p:grpSp>
+        <p:sp>
+          <p:nvSpPr>
+            <p:cNvPr id="14" name="TextBox 13">
+              <a:extLst>
+                <a:ext uri="{FF2B5EF4-FFF2-40B4-BE49-F238E27FC236}">
+                  <a16:creationId xmlns:a16="http://schemas.microsoft.com/office/drawing/2014/main" id="{0392847A-E112-643C-0843-9D64AD7FD9B8}"/>
+                </a:ext>
+              </a:extLst>
+            </p:cNvPr>
+            <p:cNvSpPr txBox="1"/>
+            <p:nvPr/>
+          </p:nvSpPr>
+          <p:spPr>
+            <a:xfrm>
+              <a:off x="277368" y="-80356"/>
+              <a:ext cx="3017520" cy="461665"/>
+            </a:xfrm>
+            <a:prstGeom prst="rect">
+              <a:avLst/>
+            </a:prstGeom>
+            <a:solidFill>
+              <a:schemeClr val="bg1"/>
+            </a:solidFill>
+            <a:ln>
+              <a:solidFill>
+                <a:schemeClr val="accent1"/>
+              </a:solidFill>
+            </a:ln>
+          </p:spPr>
+          <p:txBody>
+            <a:bodyPr wrap="square" rtlCol="0">
+              <a:spAutoFit/>
+            </a:bodyPr>
+            <a:lstStyle/>
+            <a:p>
+              <a:r>
+                <a:rPr lang="en-US" sz="2400" dirty="0"/>
+                <a:t>Using ADA=15</a:t>
+              </a:r>
+              <a:r>
+                <a:rPr lang="en-US" sz="2400" baseline="30000" dirty="0"/>
+                <a:t>o</a:t>
+              </a:r>
+              <a:endParaRPr lang="en-US" sz="2400" dirty="0"/>
+            </a:p>
+          </p:txBody>
+        </p:sp>
+      </p:grpSp>
+      <p:grpSp>
+        <p:nvGrpSpPr>
+          <p:cNvPr id="21" name="Group 20">
+            <a:extLst>
+              <a:ext uri="{FF2B5EF4-FFF2-40B4-BE49-F238E27FC236}">
+                <a16:creationId xmlns:a16="http://schemas.microsoft.com/office/drawing/2014/main" id="{EE76A1F1-748F-E68A-F8E9-1829EF0F8329}"/>
+              </a:ext>
+            </a:extLst>
+          </p:cNvPr>
+          <p:cNvGrpSpPr>
+            <a:grpSpLocks noChangeAspect="1"/>
+          </p:cNvGrpSpPr>
+          <p:nvPr/>
+        </p:nvGrpSpPr>
+        <p:grpSpPr>
+          <a:xfrm>
+            <a:off x="4714242" y="526327"/>
+            <a:ext cx="3191451" cy="2774608"/>
+            <a:chOff x="4759369" y="370184"/>
+            <a:chExt cx="4435431" cy="3856109"/>
+          </a:xfrm>
+        </p:grpSpPr>
+        <p:pic>
+          <p:nvPicPr>
+            <p:cNvPr id="17" name="Picture 16">
+              <a:extLst>
+                <a:ext uri="{FF2B5EF4-FFF2-40B4-BE49-F238E27FC236}">
+                  <a16:creationId xmlns:a16="http://schemas.microsoft.com/office/drawing/2014/main" id="{F3FE00BF-B67D-8F49-3475-24063525B7D8}"/>
+                </a:ext>
+              </a:extLst>
+            </p:cNvPr>
+            <p:cNvPicPr>
+              <a:picLocks noChangeAspect="1"/>
+            </p:cNvPicPr>
+            <p:nvPr/>
+          </p:nvPicPr>
+          <p:blipFill>
+            <a:blip r:embed="rId4"/>
+            <a:stretch>
+              <a:fillRect/>
+            </a:stretch>
+          </p:blipFill>
+          <p:spPr>
+            <a:xfrm>
+              <a:off x="4759369" y="370184"/>
+              <a:ext cx="4435431" cy="3856109"/>
+            </a:xfrm>
+            <a:prstGeom prst="rect">
+              <a:avLst/>
+            </a:prstGeom>
+          </p:spPr>
+        </p:pic>
+        <p:sp>
+          <p:nvSpPr>
+            <p:cNvPr id="18" name="TextBox 17">
+              <a:extLst>
+                <a:ext uri="{FF2B5EF4-FFF2-40B4-BE49-F238E27FC236}">
+                  <a16:creationId xmlns:a16="http://schemas.microsoft.com/office/drawing/2014/main" id="{1DC1E113-C5D6-7FB1-0E4D-66B5F90384C9}"/>
+                </a:ext>
+              </a:extLst>
+            </p:cNvPr>
+            <p:cNvSpPr txBox="1"/>
+            <p:nvPr/>
+          </p:nvSpPr>
+          <p:spPr>
+            <a:xfrm>
+              <a:off x="6452972" y="1751273"/>
+              <a:ext cx="330200" cy="369333"/>
+            </a:xfrm>
+            <a:prstGeom prst="rect">
+              <a:avLst/>
+            </a:prstGeom>
+            <a:noFill/>
+          </p:spPr>
+          <p:txBody>
+            <a:bodyPr wrap="square" rtlCol="0">
+              <a:spAutoFit/>
+            </a:bodyPr>
+            <a:lstStyle/>
+            <a:p>
+              <a:r>
+                <a:rPr lang="en-US" dirty="0"/>
+                <a:t>0</a:t>
+              </a:r>
+            </a:p>
+          </p:txBody>
+        </p:sp>
+        <p:sp>
+          <p:nvSpPr>
+            <p:cNvPr id="19" name="TextBox 18">
+              <a:extLst>
+                <a:ext uri="{FF2B5EF4-FFF2-40B4-BE49-F238E27FC236}">
+                  <a16:creationId xmlns:a16="http://schemas.microsoft.com/office/drawing/2014/main" id="{0F77F65D-B203-CDB3-30B5-0F0350657060}"/>
+                </a:ext>
+              </a:extLst>
+            </p:cNvPr>
+            <p:cNvSpPr txBox="1"/>
+            <p:nvPr/>
+          </p:nvSpPr>
+          <p:spPr>
+            <a:xfrm>
+              <a:off x="6462257" y="3338487"/>
+              <a:ext cx="330200" cy="369333"/>
+            </a:xfrm>
+            <a:prstGeom prst="rect">
+              <a:avLst/>
+            </a:prstGeom>
+            <a:noFill/>
+          </p:spPr>
+          <p:txBody>
+            <a:bodyPr wrap="square" rtlCol="0">
+              <a:spAutoFit/>
+            </a:bodyPr>
+            <a:lstStyle/>
+            <a:p>
+              <a:r>
+                <a:rPr lang="en-US" dirty="0"/>
+                <a:t>5</a:t>
+              </a:r>
+            </a:p>
+          </p:txBody>
+        </p:sp>
+      </p:grpSp>
+      <p:pic>
+        <p:nvPicPr>
+          <p:cNvPr id="20" name="Picture 19">
+            <a:extLst>
+              <a:ext uri="{FF2B5EF4-FFF2-40B4-BE49-F238E27FC236}">
+                <a16:creationId xmlns:a16="http://schemas.microsoft.com/office/drawing/2014/main" id="{1F21AFFC-8100-2E31-A65C-5AE70406CA1A}"/>
+              </a:ext>
+            </a:extLst>
+          </p:cNvPr>
+          <p:cNvPicPr>
+            <a:picLocks noChangeAspect="1"/>
+          </p:cNvPicPr>
+          <p:nvPr/>
+        </p:nvPicPr>
+        <p:blipFill>
+          <a:blip r:embed="rId5"/>
+          <a:stretch>
+            <a:fillRect/>
+          </a:stretch>
+        </p:blipFill>
+        <p:spPr>
+          <a:xfrm>
+            <a:off x="8620709" y="472126"/>
+            <a:ext cx="3170116" cy="2638419"/>
+          </a:xfrm>
+          <a:prstGeom prst="rect">
+            <a:avLst/>
+          </a:prstGeom>
+        </p:spPr>
+      </p:pic>
+    </p:spTree>
+    <p:extLst>
+      <p:ext uri="{BB962C8B-B14F-4D97-AF65-F5344CB8AC3E}">
+        <p14:creationId xmlns:p14="http://schemas.microsoft.com/office/powerpoint/2010/main" val="1657099914"/>
+      </p:ext>
+    </p:extLst>
+  </p:cSld>
+  <p:clrMapOvr>
+    <a:masterClrMapping/>
+  </p:clrMapOvr>
+</p:sld>
+</file>
+
+<file path=ppt/slides/slide3.xml><?xml version="1.0" encoding="utf-8"?>
+<p:sld xmlns:a="http://schemas.openxmlformats.org/drawingml/2006/main" xmlns:r="http://schemas.openxmlformats.org/officeDocument/2006/relationships" xmlns:p="http://schemas.openxmlformats.org/presentationml/2006/main">
+  <p:cSld>
+    <p:spTree>
+      <p:nvGrpSpPr>
+        <p:cNvPr id="1" name=""/>
+        <p:cNvGrpSpPr/>
+        <p:nvPr/>
+      </p:nvGrpSpPr>
+      <p:grpSpPr>
+        <a:xfrm>
+          <a:off x="0" y="0"/>
+          <a:ext cx="0" cy="0"/>
+          <a:chOff x="0" y="0"/>
+          <a:chExt cx="0" cy="0"/>
+        </a:xfrm>
+      </p:grpSpPr>
+      <p:grpSp>
+        <p:nvGrpSpPr>
+          <p:cNvPr id="9" name="Group 8">
+            <a:extLst>
+              <a:ext uri="{FF2B5EF4-FFF2-40B4-BE49-F238E27FC236}">
+                <a16:creationId xmlns:a16="http://schemas.microsoft.com/office/drawing/2014/main" id="{1352DAA6-BDE4-14A2-9A89-613182AB4287}"/>
+              </a:ext>
+            </a:extLst>
+          </p:cNvPr>
+          <p:cNvGrpSpPr>
+            <a:grpSpLocks noChangeAspect="1"/>
+          </p:cNvGrpSpPr>
+          <p:nvPr/>
+        </p:nvGrpSpPr>
+        <p:grpSpPr>
+          <a:xfrm>
+            <a:off x="743326" y="74710"/>
+            <a:ext cx="9825235" cy="2127081"/>
+            <a:chOff x="-646835" y="1044147"/>
+            <a:chExt cx="22031837" cy="4769707"/>
+          </a:xfrm>
+        </p:grpSpPr>
+        <p:pic>
+          <p:nvPicPr>
+            <p:cNvPr id="2" name="Picture 1">
+              <a:extLst>
+                <a:ext uri="{FF2B5EF4-FFF2-40B4-BE49-F238E27FC236}">
+                  <a16:creationId xmlns:a16="http://schemas.microsoft.com/office/drawing/2014/main" id="{999C26EC-3F55-971E-348C-B5F2F675A04D}"/>
+                </a:ext>
+              </a:extLst>
+            </p:cNvPr>
+            <p:cNvPicPr>
+              <a:picLocks noChangeAspect="1"/>
+            </p:cNvPicPr>
+            <p:nvPr/>
+          </p:nvPicPr>
+          <p:blipFill>
+            <a:blip r:embed="rId2"/>
+            <a:stretch>
+              <a:fillRect/>
+            </a:stretch>
+          </p:blipFill>
+          <p:spPr>
+            <a:xfrm>
+              <a:off x="-646835" y="1044147"/>
+              <a:ext cx="7772402" cy="4769707"/>
+            </a:xfrm>
+            <a:prstGeom prst="rect">
+              <a:avLst/>
+            </a:prstGeom>
+          </p:spPr>
+        </p:pic>
+        <p:cxnSp>
+          <p:nvCxnSpPr>
+            <p:cNvPr id="6" name="Straight Connector 5">
+              <a:extLst>
+                <a:ext uri="{FF2B5EF4-FFF2-40B4-BE49-F238E27FC236}">
+                  <a16:creationId xmlns:a16="http://schemas.microsoft.com/office/drawing/2014/main" id="{60AF5BC4-7756-F774-860B-E106C7A16AE9}"/>
+                </a:ext>
+              </a:extLst>
+            </p:cNvPr>
+            <p:cNvCxnSpPr>
+              <a:cxnSpLocks/>
+            </p:cNvCxnSpPr>
+            <p:nvPr/>
+          </p:nvCxnSpPr>
+          <p:spPr>
+            <a:xfrm flipV="1">
+              <a:off x="-245170" y="1929539"/>
+              <a:ext cx="7090474" cy="2123267"/>
+            </a:xfrm>
+            <a:prstGeom prst="line">
+              <a:avLst/>
+            </a:prstGeom>
+            <a:ln w="25400">
+              <a:solidFill>
+                <a:srgbClr val="FF0000"/>
+              </a:solidFill>
+            </a:ln>
+          </p:spPr>
+          <p:style>
+            <a:lnRef idx="1">
+              <a:schemeClr val="accent1"/>
+            </a:lnRef>
+            <a:fillRef idx="0">
+              <a:schemeClr val="accent1"/>
+            </a:fillRef>
+            <a:effectRef idx="0">
+              <a:schemeClr val="accent1"/>
+            </a:effectRef>
+            <a:fontRef idx="minor">
+              <a:schemeClr val="tx1"/>
+            </a:fontRef>
+          </p:style>
+        </p:cxnSp>
+        <p:sp>
+          <p:nvSpPr>
+            <p:cNvPr id="10" name="TextBox 9">
+              <a:extLst>
+                <a:ext uri="{FF2B5EF4-FFF2-40B4-BE49-F238E27FC236}">
+                  <a16:creationId xmlns:a16="http://schemas.microsoft.com/office/drawing/2014/main" id="{7A11AA40-6C85-C843-94B8-962D5C9F653C}"/>
+                </a:ext>
+              </a:extLst>
+            </p:cNvPr>
+            <p:cNvSpPr txBox="1"/>
+            <p:nvPr/>
+          </p:nvSpPr>
+          <p:spPr>
+            <a:xfrm>
+              <a:off x="9723212" y="2651816"/>
+              <a:ext cx="11661790" cy="1035225"/>
+            </a:xfrm>
+            <a:prstGeom prst="rect">
+              <a:avLst/>
+            </a:prstGeom>
+            <a:noFill/>
+          </p:spPr>
+          <p:txBody>
+            <a:bodyPr wrap="square" rtlCol="0">
+              <a:spAutoFit/>
+            </a:bodyPr>
+            <a:lstStyle/>
+            <a:p>
+              <a:r>
+                <a:rPr lang="en-US" sz="2400" dirty="0"/>
+                <a:t>This is segments4, using ADA=25</a:t>
+              </a:r>
+              <a:r>
+                <a:rPr lang="en-US" sz="2400" baseline="30000" dirty="0"/>
+                <a:t>o</a:t>
+              </a:r>
+              <a:endParaRPr lang="en-US" sz="2400" dirty="0"/>
+            </a:p>
+          </p:txBody>
+        </p:sp>
+      </p:grpSp>
+      <p:grpSp>
+        <p:nvGrpSpPr>
+          <p:cNvPr id="11" name="Group 10">
+            <a:extLst>
+              <a:ext uri="{FF2B5EF4-FFF2-40B4-BE49-F238E27FC236}">
+                <a16:creationId xmlns:a16="http://schemas.microsoft.com/office/drawing/2014/main" id="{059D0753-18C5-03B1-DB19-EA94DB2CE7AB}"/>
+              </a:ext>
+            </a:extLst>
+          </p:cNvPr>
+          <p:cNvGrpSpPr>
+            <a:grpSpLocks noChangeAspect="1"/>
+          </p:cNvGrpSpPr>
+          <p:nvPr/>
+        </p:nvGrpSpPr>
+        <p:grpSpPr>
+          <a:xfrm>
+            <a:off x="743330" y="2253961"/>
+            <a:ext cx="9615108" cy="1921553"/>
+            <a:chOff x="2356104" y="739648"/>
+            <a:chExt cx="21606508" cy="4318000"/>
+          </a:xfrm>
+        </p:grpSpPr>
+        <p:grpSp>
+          <p:nvGrpSpPr>
+            <p:cNvPr id="12" name="Group 11">
+              <a:extLst>
+                <a:ext uri="{FF2B5EF4-FFF2-40B4-BE49-F238E27FC236}">
+                  <a16:creationId xmlns:a16="http://schemas.microsoft.com/office/drawing/2014/main" id="{6A3954E0-2BBE-9856-AD0F-A42740E0B1E3}"/>
+                </a:ext>
+              </a:extLst>
+            </p:cNvPr>
+            <p:cNvGrpSpPr/>
+            <p:nvPr/>
+          </p:nvGrpSpPr>
+          <p:grpSpPr>
+            <a:xfrm>
+              <a:off x="2356104" y="739648"/>
+              <a:ext cx="7772400" cy="4318000"/>
+              <a:chOff x="2209800" y="1270000"/>
+              <a:chExt cx="7772400" cy="4318000"/>
+            </a:xfrm>
+          </p:grpSpPr>
+          <p:pic>
+            <p:nvPicPr>
+              <p:cNvPr id="14" name="Picture 13">
+                <a:extLst>
+                  <a:ext uri="{FF2B5EF4-FFF2-40B4-BE49-F238E27FC236}">
+                    <a16:creationId xmlns:a16="http://schemas.microsoft.com/office/drawing/2014/main" id="{FD2A4D24-8BB6-FD13-C975-992BC97C032C}"/>
+                  </a:ext>
+                </a:extLst>
+              </p:cNvPr>
+              <p:cNvPicPr>
+                <a:picLocks noChangeAspect="1"/>
+              </p:cNvPicPr>
+              <p:nvPr/>
+            </p:nvPicPr>
+            <p:blipFill>
+              <a:blip r:embed="rId3"/>
+              <a:stretch>
+                <a:fillRect/>
+              </a:stretch>
+            </p:blipFill>
+            <p:spPr>
+              <a:xfrm>
+                <a:off x="2209800" y="1270000"/>
+                <a:ext cx="7772400" cy="4318000"/>
+              </a:xfrm>
+              <a:prstGeom prst="rect">
+                <a:avLst/>
+              </a:prstGeom>
+            </p:spPr>
+          </p:pic>
+          <p:cxnSp>
+            <p:nvCxnSpPr>
+              <p:cNvPr id="15" name="Straight Connector 14">
+                <a:extLst>
+                  <a:ext uri="{FF2B5EF4-FFF2-40B4-BE49-F238E27FC236}">
+                    <a16:creationId xmlns:a16="http://schemas.microsoft.com/office/drawing/2014/main" id="{AFEB09E1-9F59-8D27-F900-99839E275C4F}"/>
+                  </a:ext>
+                </a:extLst>
+              </p:cNvPr>
+              <p:cNvCxnSpPr>
+                <a:cxnSpLocks/>
+              </p:cNvCxnSpPr>
+              <p:nvPr/>
+            </p:nvCxnSpPr>
+            <p:spPr>
+              <a:xfrm flipV="1">
+                <a:off x="2843784" y="2635135"/>
+                <a:ext cx="6915358" cy="876161"/>
+              </a:xfrm>
+              <a:prstGeom prst="line">
+                <a:avLst/>
+              </a:prstGeom>
+              <a:ln w="25400">
+                <a:solidFill>
+                  <a:srgbClr val="FF0000"/>
+                </a:solidFill>
+              </a:ln>
+            </p:spPr>
+            <p:style>
+              <a:lnRef idx="1">
+                <a:schemeClr val="accent1"/>
+              </a:lnRef>
+              <a:fillRef idx="0">
+                <a:schemeClr val="accent1"/>
+              </a:fillRef>
+              <a:effectRef idx="0">
+                <a:schemeClr val="accent1"/>
+              </a:effectRef>
+              <a:fontRef idx="minor">
+                <a:schemeClr val="tx1"/>
+              </a:fontRef>
+            </p:style>
+          </p:cxnSp>
+        </p:grpSp>
+        <p:sp>
+          <p:nvSpPr>
+            <p:cNvPr id="13" name="TextBox 12">
+              <a:extLst>
+                <a:ext uri="{FF2B5EF4-FFF2-40B4-BE49-F238E27FC236}">
+                  <a16:creationId xmlns:a16="http://schemas.microsoft.com/office/drawing/2014/main" id="{8FE16D11-A6DE-8934-15A4-97ADB1A0454A}"/>
+                </a:ext>
+              </a:extLst>
+            </p:cNvPr>
+            <p:cNvSpPr txBox="1"/>
+            <p:nvPr/>
+          </p:nvSpPr>
+          <p:spPr>
+            <a:xfrm>
+              <a:off x="12748196" y="2342700"/>
+              <a:ext cx="11214416" cy="1037426"/>
+            </a:xfrm>
+            <a:prstGeom prst="rect">
+              <a:avLst/>
+            </a:prstGeom>
+            <a:noFill/>
+          </p:spPr>
+          <p:txBody>
+            <a:bodyPr wrap="square" rtlCol="0">
+              <a:spAutoFit/>
+            </a:bodyPr>
+            <a:lstStyle/>
+            <a:p>
+              <a:r>
+                <a:rPr lang="en-US" sz="2400" dirty="0"/>
+                <a:t>This is segments4, using ADA=15</a:t>
+              </a:r>
+              <a:r>
+                <a:rPr lang="en-US" sz="2400" baseline="30000" dirty="0"/>
+                <a:t>o</a:t>
+              </a:r>
+              <a:endParaRPr lang="en-US" sz="2400" dirty="0"/>
+            </a:p>
+          </p:txBody>
+        </p:sp>
+      </p:grpSp>
+      <p:grpSp>
+        <p:nvGrpSpPr>
+          <p:cNvPr id="16" name="Group 15">
+            <a:extLst>
+              <a:ext uri="{FF2B5EF4-FFF2-40B4-BE49-F238E27FC236}">
+                <a16:creationId xmlns:a16="http://schemas.microsoft.com/office/drawing/2014/main" id="{CE1AEAC8-BCA3-D6CB-92A5-69B61ACE3E51}"/>
+              </a:ext>
+            </a:extLst>
+          </p:cNvPr>
+          <p:cNvGrpSpPr>
+            <a:grpSpLocks noChangeAspect="1"/>
+          </p:cNvGrpSpPr>
+          <p:nvPr/>
+        </p:nvGrpSpPr>
+        <p:grpSpPr>
+          <a:xfrm>
+            <a:off x="922451" y="4781434"/>
+            <a:ext cx="9969046" cy="1013456"/>
+            <a:chOff x="2002536" y="2333290"/>
+            <a:chExt cx="21556298" cy="2191419"/>
+          </a:xfrm>
+        </p:grpSpPr>
+        <p:pic>
+          <p:nvPicPr>
+            <p:cNvPr id="17" name="Picture 16">
+              <a:extLst>
+                <a:ext uri="{FF2B5EF4-FFF2-40B4-BE49-F238E27FC236}">
+                  <a16:creationId xmlns:a16="http://schemas.microsoft.com/office/drawing/2014/main" id="{56741440-AEA1-5CDA-08E0-D4EA0FC871AD}"/>
+                </a:ext>
+              </a:extLst>
+            </p:cNvPr>
+            <p:cNvPicPr>
+              <a:picLocks noChangeAspect="1"/>
+            </p:cNvPicPr>
+            <p:nvPr/>
+          </p:nvPicPr>
+          <p:blipFill>
+            <a:blip r:embed="rId4"/>
+            <a:stretch>
+              <a:fillRect/>
+            </a:stretch>
+          </p:blipFill>
+          <p:spPr>
+            <a:xfrm>
+              <a:off x="2209800" y="2333290"/>
+              <a:ext cx="7772400" cy="2191419"/>
+            </a:xfrm>
+            <a:prstGeom prst="rect">
+              <a:avLst/>
+            </a:prstGeom>
+          </p:spPr>
+        </p:pic>
+        <p:cxnSp>
+          <p:nvCxnSpPr>
+            <p:cNvPr id="18" name="Straight Connector 17">
+              <a:extLst>
+                <a:ext uri="{FF2B5EF4-FFF2-40B4-BE49-F238E27FC236}">
+                  <a16:creationId xmlns:a16="http://schemas.microsoft.com/office/drawing/2014/main" id="{91B86335-EF5A-57B3-0C87-4C905A1DAE50}"/>
+                </a:ext>
+              </a:extLst>
+            </p:cNvPr>
+            <p:cNvCxnSpPr>
+              <a:cxnSpLocks/>
+            </p:cNvCxnSpPr>
+            <p:nvPr/>
+          </p:nvCxnSpPr>
+          <p:spPr>
+            <a:xfrm flipV="1">
+              <a:off x="2002536" y="3388386"/>
+              <a:ext cx="7837708" cy="333222"/>
+            </a:xfrm>
+            <a:prstGeom prst="line">
+              <a:avLst/>
+            </a:prstGeom>
+            <a:ln w="25400">
+              <a:solidFill>
+                <a:srgbClr val="FF0000"/>
+              </a:solidFill>
+            </a:ln>
+          </p:spPr>
+          <p:style>
+            <a:lnRef idx="1">
+              <a:schemeClr val="accent1"/>
+            </a:lnRef>
+            <a:fillRef idx="0">
+              <a:schemeClr val="accent1"/>
+            </a:fillRef>
+            <a:effectRef idx="0">
+              <a:schemeClr val="accent1"/>
+            </a:effectRef>
+            <a:fontRef idx="minor">
+              <a:schemeClr val="tx1"/>
+            </a:fontRef>
+          </p:style>
+        </p:cxnSp>
+        <p:sp>
+          <p:nvSpPr>
+            <p:cNvPr id="19" name="TextBox 18">
+              <a:extLst>
+                <a:ext uri="{FF2B5EF4-FFF2-40B4-BE49-F238E27FC236}">
+                  <a16:creationId xmlns:a16="http://schemas.microsoft.com/office/drawing/2014/main" id="{BCC5D910-A32E-2339-9565-6A24D2D6C0BD}"/>
+                </a:ext>
+              </a:extLst>
+            </p:cNvPr>
+            <p:cNvSpPr txBox="1"/>
+            <p:nvPr/>
+          </p:nvSpPr>
+          <p:spPr>
+            <a:xfrm>
+              <a:off x="11615061" y="3055863"/>
+              <a:ext cx="11943773" cy="998269"/>
+            </a:xfrm>
+            <a:prstGeom prst="rect">
+              <a:avLst/>
+            </a:prstGeom>
+            <a:noFill/>
+          </p:spPr>
+          <p:txBody>
+            <a:bodyPr wrap="square" rtlCol="0">
+              <a:spAutoFit/>
+            </a:bodyPr>
+            <a:lstStyle/>
+            <a:p>
+              <a:r>
+                <a:rPr lang="en-US" sz="2400" dirty="0"/>
+                <a:t>This is segments4, using ADA=5</a:t>
+              </a:r>
+              <a:r>
+                <a:rPr lang="en-US" sz="2400" baseline="30000" dirty="0"/>
+                <a:t>o</a:t>
+              </a:r>
+              <a:endParaRPr lang="en-US" sz="2400" dirty="0"/>
+            </a:p>
+          </p:txBody>
+        </p:sp>
+      </p:grpSp>
+    </p:spTree>
+    <p:extLst>
+      <p:ext uri="{BB962C8B-B14F-4D97-AF65-F5344CB8AC3E}">
+        <p14:creationId xmlns:p14="http://schemas.microsoft.com/office/powerpoint/2010/main" val="1490553439"/>
       </p:ext>
     </p:extLst>
   </p:cSld>

</xml_diff>

<commit_message>
Documenting the ABCD angle studies
</commit_message>
<xml_diff>
--- a/crystals/2023-07-03/case4.0 (calibration, nesh's version)/Segments4_retrieved analysis.pptx
+++ b/crystals/2023-07-03/case4.0 (calibration, nesh's version)/Segments4_retrieved analysis.pptx
@@ -3622,13 +3622,18 @@
         </p:nvSpPr>
         <p:spPr>
           <a:xfrm>
-            <a:off x="4035580" y="3429000"/>
-            <a:ext cx="8047454" cy="3139321"/>
+            <a:off x="3859454" y="3355515"/>
+            <a:ext cx="8332546" cy="3139321"/>
           </a:xfrm>
           <a:prstGeom prst="rect">
             <a:avLst/>
           </a:prstGeom>
           <a:noFill/>
+          <a:ln>
+            <a:solidFill>
+              <a:schemeClr val="accent1"/>
+            </a:solidFill>
+          </a:ln>
         </p:spPr>
         <p:txBody>
           <a:bodyPr wrap="square" rtlCol="0">
@@ -3638,7 +3643,7 @@
           <a:p>
             <a:r>
               <a:rPr lang="en-US" dirty="0"/>
-              <a:t>Results:</a:t>
+              <a:t>Observations:</a:t>
             </a:r>
           </a:p>
           <a:p>
@@ -3652,7 +3657,7 @@
             </a:r>
             <a:r>
               <a:rPr lang="en-US" b="1" dirty="0"/>
-              <a:t>ABT=17</a:t>
+              <a:t>ABCD=17</a:t>
             </a:r>
             <a:r>
               <a:rPr lang="en-US" b="1" baseline="30000" dirty="0"/>
@@ -3676,7 +3681,7 @@
             </a:r>
             <a:r>
               <a:rPr lang="en-US" b="1" dirty="0"/>
-              <a:t>ABT=15</a:t>
+              <a:t>ABCD=15</a:t>
             </a:r>
             <a:r>
               <a:rPr lang="en-US" b="1" baseline="30000" dirty="0"/>
@@ -3696,7 +3701,7 @@
             </a:r>
             <a:r>
               <a:rPr lang="en-US" b="1" dirty="0"/>
-              <a:t>ABT=20</a:t>
+              <a:t>ABCD =20</a:t>
             </a:r>
             <a:r>
               <a:rPr lang="en-US" b="1" baseline="30000" dirty="0"/>
@@ -3718,7 +3723,7 @@
             </a:r>
             <a:r>
               <a:rPr lang="en-US" b="1" dirty="0"/>
-              <a:t>smaller ABT values </a:t>
+              <a:t>smaller ABCD values </a:t>
             </a:r>
             <a:r>
               <a:rPr lang="en-US" dirty="0"/>
@@ -3740,19 +3745,11 @@
             </a:pPr>
             <a:r>
               <a:rPr lang="en-US" dirty="0"/>
-              <a:t>The apparent </a:t>
-            </a:r>
-            <a:r>
-              <a:rPr lang="en-US" dirty="0" err="1"/>
-              <a:t>cocave</a:t>
-            </a:r>
-            <a:r>
-              <a:rPr lang="en-US" dirty="0"/>
-              <a:t> curvature of the center of the basal facet (see next slide) increases with ADA. Therefore, using the more accurate </a:t>
+              <a:t>Consistent with this, apparent concave curvature of the center of the basal facet (see next slide) also increases with ADA. Therefore, the more accurate </a:t>
             </a:r>
             <a:r>
               <a:rPr lang="en-US" b="1" dirty="0"/>
-              <a:t>ADA=17</a:t>
+              <a:t>ABCD =17</a:t>
             </a:r>
             <a:r>
               <a:rPr lang="en-US" b="1" baseline="30000" dirty="0"/>
@@ -3760,13 +3757,28 @@
             </a:r>
             <a:r>
               <a:rPr lang="en-US" dirty="0"/>
-              <a:t> will produce a slightly more concave surface. We conclude that the concavity is “real” (i.e., not an artifact of a </a:t>
-            </a:r>
-            <a:r>
-              <a:rPr lang="en-US"/>
-              <a:t>bad value of ADA).</a:t>
-            </a:r>
-            <a:endParaRPr lang="en-US" dirty="0"/>
+              <a:t> will produce a slightly more concave surface. We conclude that the concavity we observed at </a:t>
+            </a:r>
+            <a:r>
+              <a:rPr lang="en-US" b="1" dirty="0"/>
+              <a:t>ABCD =17</a:t>
+            </a:r>
+            <a:r>
+              <a:rPr lang="en-US" b="1" baseline="30000" dirty="0"/>
+              <a:t>o</a:t>
+            </a:r>
+            <a:r>
+              <a:rPr lang="en-US" dirty="0"/>
+              <a:t> is “real” (i.e., not an artifact of a bad value </a:t>
+            </a:r>
+            <a:r>
+              <a:rPr lang="en-US"/>
+              <a:t>of ABCD</a:t>
+            </a:r>
+            <a:r>
+              <a:rPr lang="en-US" dirty="0"/>
+              <a:t>).</a:t>
+            </a:r>
           </a:p>
         </p:txBody>
       </p:sp>
@@ -3785,7 +3797,7 @@
         <p:grpSpPr>
           <a:xfrm>
             <a:off x="144046" y="524811"/>
-            <a:ext cx="4000500" cy="2245968"/>
+            <a:ext cx="3565069" cy="2137316"/>
             <a:chOff x="277368" y="3183282"/>
             <a:chExt cx="4000500" cy="2245968"/>
           </a:xfrm>
@@ -3928,7 +3940,15 @@
             <a:p>
               <a:r>
                 <a:rPr lang="en-US" sz="2400" dirty="0"/>
-                <a:t>Using ADA=17</a:t>
+                <a:t>Using ABCD</a:t>
+              </a:r>
+              <a:r>
+                <a:rPr lang="en-US" sz="2400" b="1" dirty="0"/>
+                <a:t> </a:t>
+              </a:r>
+              <a:r>
+                <a:rPr lang="en-US" sz="2400" dirty="0"/>
+                <a:t>= 17</a:t>
               </a:r>
               <a:r>
                 <a:rPr lang="en-US" sz="2400" baseline="30000" dirty="0"/>
@@ -3953,8 +3973,8 @@
         </p:nvGrpSpPr>
         <p:grpSpPr>
           <a:xfrm>
-            <a:off x="225580" y="3521295"/>
-            <a:ext cx="3810000" cy="2257485"/>
+            <a:off x="161185" y="3521295"/>
+            <a:ext cx="3547930" cy="2081015"/>
             <a:chOff x="277368" y="-80356"/>
             <a:chExt cx="3810000" cy="2257485"/>
           </a:xfrm>
@@ -4097,7 +4117,15 @@
             <a:p>
               <a:r>
                 <a:rPr lang="en-US" sz="2400" dirty="0"/>
-                <a:t>Using ADA=15</a:t>
+                <a:t>Using ABCD</a:t>
+              </a:r>
+              <a:r>
+                <a:rPr lang="en-US" sz="2400" b="1" dirty="0"/>
+                <a:t> </a:t>
+              </a:r>
+              <a:r>
+                <a:rPr lang="en-US" sz="2400" dirty="0"/>
+                <a:t>= 15</a:t>
               </a:r>
               <a:r>
                 <a:rPr lang="en-US" sz="2400" baseline="30000" dirty="0"/>

</xml_diff>